<commit_message>
write chapter 12:merge branch
</commit_message>
<xml_diff>
--- a/pptx/chapter-12.pptx
+++ b/pptx/chapter-12.pptx
@@ -9,6 +9,17 @@
     <p:sldId id="274" r:id="rId3"/>
     <p:sldId id="275" r:id="rId4"/>
     <p:sldId id="276" r:id="rId5"/>
+    <p:sldId id="277" r:id="rId6"/>
+    <p:sldId id="278" r:id="rId7"/>
+    <p:sldId id="279" r:id="rId8"/>
+    <p:sldId id="280" r:id="rId9"/>
+    <p:sldId id="281" r:id="rId10"/>
+    <p:sldId id="282" r:id="rId11"/>
+    <p:sldId id="283" r:id="rId12"/>
+    <p:sldId id="284" r:id="rId13"/>
+    <p:sldId id="285" r:id="rId14"/>
+    <p:sldId id="286" r:id="rId15"/>
+    <p:sldId id="287" r:id="rId16"/>
   </p:sldIdLst>
   <p:sldSz cx="9144000" cy="6858000" type="screen4x3"/>
   <p:notesSz cx="6858000" cy="9144000"/>
@@ -3299,6 +3310,330 @@
 </p:sld>
 </file>
 
+<file path=ppt/slides/slide10.xml><?xml version="1.0" encoding="utf-8"?>
+<p:sld xmlns:a="http://schemas.openxmlformats.org/drawingml/2006/main" xmlns:r="http://schemas.openxmlformats.org/officeDocument/2006/relationships" xmlns:p="http://schemas.openxmlformats.org/presentationml/2006/main">
+  <p:cSld>
+    <p:spTree>
+      <p:nvGrpSpPr>
+        <p:cNvPr id="1" name=""/>
+        <p:cNvGrpSpPr/>
+        <p:nvPr/>
+      </p:nvGrpSpPr>
+      <p:grpSpPr>
+        <a:xfrm>
+          <a:off x="0" y="0"/>
+          <a:ext cx="0" cy="0"/>
+          <a:chOff x="0" y="0"/>
+          <a:chExt cx="0" cy="0"/>
+        </a:xfrm>
+      </p:grpSpPr>
+      <p:pic>
+        <p:nvPicPr>
+          <p:cNvPr id="2" name="図 1"/>
+          <p:cNvPicPr>
+            <a:picLocks noChangeAspect="1"/>
+          </p:cNvPicPr>
+          <p:nvPr/>
+        </p:nvPicPr>
+        <p:blipFill>
+          <a:blip r:embed="rId2"/>
+          <a:stretch>
+            <a:fillRect/>
+          </a:stretch>
+        </p:blipFill>
+        <p:spPr>
+          <a:xfrm>
+            <a:off x="2424112" y="2019300"/>
+            <a:ext cx="4295775" cy="2819400"/>
+          </a:xfrm>
+          <a:prstGeom prst="rect">
+            <a:avLst/>
+          </a:prstGeom>
+        </p:spPr>
+      </p:pic>
+    </p:spTree>
+    <p:extLst>
+      <p:ext uri="{BB962C8B-B14F-4D97-AF65-F5344CB8AC3E}">
+        <p14:creationId xmlns:p14="http://schemas.microsoft.com/office/powerpoint/2010/main" val="2312391263"/>
+      </p:ext>
+    </p:extLst>
+  </p:cSld>
+  <p:clrMapOvr>
+    <a:masterClrMapping/>
+  </p:clrMapOvr>
+</p:sld>
+</file>
+
+<file path=ppt/slides/slide11.xml><?xml version="1.0" encoding="utf-8"?>
+<p:sld xmlns:a="http://schemas.openxmlformats.org/drawingml/2006/main" xmlns:r="http://schemas.openxmlformats.org/officeDocument/2006/relationships" xmlns:p="http://schemas.openxmlformats.org/presentationml/2006/main">
+  <p:cSld>
+    <p:spTree>
+      <p:nvGrpSpPr>
+        <p:cNvPr id="1" name=""/>
+        <p:cNvGrpSpPr/>
+        <p:nvPr/>
+      </p:nvGrpSpPr>
+      <p:grpSpPr>
+        <a:xfrm>
+          <a:off x="0" y="0"/>
+          <a:ext cx="0" cy="0"/>
+          <a:chOff x="0" y="0"/>
+          <a:chExt cx="0" cy="0"/>
+        </a:xfrm>
+      </p:grpSpPr>
+      <p:pic>
+        <p:nvPicPr>
+          <p:cNvPr id="2" name="図 1"/>
+          <p:cNvPicPr>
+            <a:picLocks noChangeAspect="1"/>
+          </p:cNvPicPr>
+          <p:nvPr/>
+        </p:nvPicPr>
+        <p:blipFill>
+          <a:blip r:embed="rId2"/>
+          <a:stretch>
+            <a:fillRect/>
+          </a:stretch>
+        </p:blipFill>
+        <p:spPr>
+          <a:xfrm>
+            <a:off x="1395412" y="1971675"/>
+            <a:ext cx="6353175" cy="2914650"/>
+          </a:xfrm>
+          <a:prstGeom prst="rect">
+            <a:avLst/>
+          </a:prstGeom>
+        </p:spPr>
+      </p:pic>
+    </p:spTree>
+    <p:extLst>
+      <p:ext uri="{BB962C8B-B14F-4D97-AF65-F5344CB8AC3E}">
+        <p14:creationId xmlns:p14="http://schemas.microsoft.com/office/powerpoint/2010/main" val="1824461842"/>
+      </p:ext>
+    </p:extLst>
+  </p:cSld>
+  <p:clrMapOvr>
+    <a:masterClrMapping/>
+  </p:clrMapOvr>
+</p:sld>
+</file>
+
+<file path=ppt/slides/slide12.xml><?xml version="1.0" encoding="utf-8"?>
+<p:sld xmlns:a="http://schemas.openxmlformats.org/drawingml/2006/main" xmlns:r="http://schemas.openxmlformats.org/officeDocument/2006/relationships" xmlns:p="http://schemas.openxmlformats.org/presentationml/2006/main">
+  <p:cSld>
+    <p:spTree>
+      <p:nvGrpSpPr>
+        <p:cNvPr id="1" name=""/>
+        <p:cNvGrpSpPr/>
+        <p:nvPr/>
+      </p:nvGrpSpPr>
+      <p:grpSpPr>
+        <a:xfrm>
+          <a:off x="0" y="0"/>
+          <a:ext cx="0" cy="0"/>
+          <a:chOff x="0" y="0"/>
+          <a:chExt cx="0" cy="0"/>
+        </a:xfrm>
+      </p:grpSpPr>
+      <p:pic>
+        <p:nvPicPr>
+          <p:cNvPr id="2" name="図 1"/>
+          <p:cNvPicPr>
+            <a:picLocks noChangeAspect="1"/>
+          </p:cNvPicPr>
+          <p:nvPr/>
+        </p:nvPicPr>
+        <p:blipFill>
+          <a:blip r:embed="rId2"/>
+          <a:stretch>
+            <a:fillRect/>
+          </a:stretch>
+        </p:blipFill>
+        <p:spPr>
+          <a:xfrm>
+            <a:off x="1395412" y="1971675"/>
+            <a:ext cx="6353175" cy="2914650"/>
+          </a:xfrm>
+          <a:prstGeom prst="rect">
+            <a:avLst/>
+          </a:prstGeom>
+        </p:spPr>
+      </p:pic>
+    </p:spTree>
+    <p:extLst>
+      <p:ext uri="{BB962C8B-B14F-4D97-AF65-F5344CB8AC3E}">
+        <p14:creationId xmlns:p14="http://schemas.microsoft.com/office/powerpoint/2010/main" val="553815346"/>
+      </p:ext>
+    </p:extLst>
+  </p:cSld>
+  <p:clrMapOvr>
+    <a:masterClrMapping/>
+  </p:clrMapOvr>
+</p:sld>
+</file>
+
+<file path=ppt/slides/slide13.xml><?xml version="1.0" encoding="utf-8"?>
+<p:sld xmlns:a="http://schemas.openxmlformats.org/drawingml/2006/main" xmlns:r="http://schemas.openxmlformats.org/officeDocument/2006/relationships" xmlns:p="http://schemas.openxmlformats.org/presentationml/2006/main">
+  <p:cSld>
+    <p:spTree>
+      <p:nvGrpSpPr>
+        <p:cNvPr id="1" name=""/>
+        <p:cNvGrpSpPr/>
+        <p:nvPr/>
+      </p:nvGrpSpPr>
+      <p:grpSpPr>
+        <a:xfrm>
+          <a:off x="0" y="0"/>
+          <a:ext cx="0" cy="0"/>
+          <a:chOff x="0" y="0"/>
+          <a:chExt cx="0" cy="0"/>
+        </a:xfrm>
+      </p:grpSpPr>
+      <p:pic>
+        <p:nvPicPr>
+          <p:cNvPr id="2" name="図 1"/>
+          <p:cNvPicPr>
+            <a:picLocks noChangeAspect="1"/>
+          </p:cNvPicPr>
+          <p:nvPr/>
+        </p:nvPicPr>
+        <p:blipFill>
+          <a:blip r:embed="rId2"/>
+          <a:stretch>
+            <a:fillRect/>
+          </a:stretch>
+        </p:blipFill>
+        <p:spPr>
+          <a:xfrm>
+            <a:off x="1504950" y="1257300"/>
+            <a:ext cx="6134100" cy="4343400"/>
+          </a:xfrm>
+          <a:prstGeom prst="rect">
+            <a:avLst/>
+          </a:prstGeom>
+        </p:spPr>
+      </p:pic>
+    </p:spTree>
+    <p:extLst>
+      <p:ext uri="{BB962C8B-B14F-4D97-AF65-F5344CB8AC3E}">
+        <p14:creationId xmlns:p14="http://schemas.microsoft.com/office/powerpoint/2010/main" val="1896238468"/>
+      </p:ext>
+    </p:extLst>
+  </p:cSld>
+  <p:clrMapOvr>
+    <a:masterClrMapping/>
+  </p:clrMapOvr>
+</p:sld>
+</file>
+
+<file path=ppt/slides/slide14.xml><?xml version="1.0" encoding="utf-8"?>
+<p:sld xmlns:a="http://schemas.openxmlformats.org/drawingml/2006/main" xmlns:r="http://schemas.openxmlformats.org/officeDocument/2006/relationships" xmlns:p="http://schemas.openxmlformats.org/presentationml/2006/main">
+  <p:cSld>
+    <p:spTree>
+      <p:nvGrpSpPr>
+        <p:cNvPr id="1" name=""/>
+        <p:cNvGrpSpPr/>
+        <p:nvPr/>
+      </p:nvGrpSpPr>
+      <p:grpSpPr>
+        <a:xfrm>
+          <a:off x="0" y="0"/>
+          <a:ext cx="0" cy="0"/>
+          <a:chOff x="0" y="0"/>
+          <a:chExt cx="0" cy="0"/>
+        </a:xfrm>
+      </p:grpSpPr>
+      <p:pic>
+        <p:nvPicPr>
+          <p:cNvPr id="2" name="図 1"/>
+          <p:cNvPicPr>
+            <a:picLocks noChangeAspect="1"/>
+          </p:cNvPicPr>
+          <p:nvPr/>
+        </p:nvPicPr>
+        <p:blipFill>
+          <a:blip r:embed="rId2"/>
+          <a:stretch>
+            <a:fillRect/>
+          </a:stretch>
+        </p:blipFill>
+        <p:spPr>
+          <a:xfrm>
+            <a:off x="0" y="809625"/>
+            <a:ext cx="9144000" cy="5238750"/>
+          </a:xfrm>
+          <a:prstGeom prst="rect">
+            <a:avLst/>
+          </a:prstGeom>
+        </p:spPr>
+      </p:pic>
+    </p:spTree>
+    <p:extLst>
+      <p:ext uri="{BB962C8B-B14F-4D97-AF65-F5344CB8AC3E}">
+        <p14:creationId xmlns:p14="http://schemas.microsoft.com/office/powerpoint/2010/main" val="3278291673"/>
+      </p:ext>
+    </p:extLst>
+  </p:cSld>
+  <p:clrMapOvr>
+    <a:masterClrMapping/>
+  </p:clrMapOvr>
+</p:sld>
+</file>
+
+<file path=ppt/slides/slide15.xml><?xml version="1.0" encoding="utf-8"?>
+<p:sld xmlns:a="http://schemas.openxmlformats.org/drawingml/2006/main" xmlns:r="http://schemas.openxmlformats.org/officeDocument/2006/relationships" xmlns:p="http://schemas.openxmlformats.org/presentationml/2006/main">
+  <p:cSld>
+    <p:spTree>
+      <p:nvGrpSpPr>
+        <p:cNvPr id="1" name=""/>
+        <p:cNvGrpSpPr/>
+        <p:nvPr/>
+      </p:nvGrpSpPr>
+      <p:grpSpPr>
+        <a:xfrm>
+          <a:off x="0" y="0"/>
+          <a:ext cx="0" cy="0"/>
+          <a:chOff x="0" y="0"/>
+          <a:chExt cx="0" cy="0"/>
+        </a:xfrm>
+      </p:grpSpPr>
+      <p:pic>
+        <p:nvPicPr>
+          <p:cNvPr id="2" name="図 1"/>
+          <p:cNvPicPr>
+            <a:picLocks noChangeAspect="1"/>
+          </p:cNvPicPr>
+          <p:nvPr/>
+        </p:nvPicPr>
+        <p:blipFill>
+          <a:blip r:embed="rId2"/>
+          <a:stretch>
+            <a:fillRect/>
+          </a:stretch>
+        </p:blipFill>
+        <p:spPr>
+          <a:xfrm>
+            <a:off x="1628775" y="942975"/>
+            <a:ext cx="5886450" cy="4972050"/>
+          </a:xfrm>
+          <a:prstGeom prst="rect">
+            <a:avLst/>
+          </a:prstGeom>
+        </p:spPr>
+      </p:pic>
+    </p:spTree>
+    <p:extLst>
+      <p:ext uri="{BB962C8B-B14F-4D97-AF65-F5344CB8AC3E}">
+        <p14:creationId xmlns:p14="http://schemas.microsoft.com/office/powerpoint/2010/main" val="70117524"/>
+      </p:ext>
+    </p:extLst>
+  </p:cSld>
+  <p:clrMapOvr>
+    <a:masterClrMapping/>
+  </p:clrMapOvr>
+</p:sld>
+</file>
+
 <file path=ppt/slides/slide2.xml><?xml version="1.0" encoding="utf-8"?>
 <p:sld xmlns:a="http://schemas.openxmlformats.org/drawingml/2006/main" xmlns:r="http://schemas.openxmlformats.org/officeDocument/2006/relationships" xmlns:p="http://schemas.openxmlformats.org/presentationml/2006/main">
   <p:cSld>
@@ -3452,6 +3787,276 @@
     <p:extLst>
       <p:ext uri="{BB962C8B-B14F-4D97-AF65-F5344CB8AC3E}">
         <p14:creationId xmlns:p14="http://schemas.microsoft.com/office/powerpoint/2010/main" val="3511219993"/>
+      </p:ext>
+    </p:extLst>
+  </p:cSld>
+  <p:clrMapOvr>
+    <a:masterClrMapping/>
+  </p:clrMapOvr>
+</p:sld>
+</file>
+
+<file path=ppt/slides/slide5.xml><?xml version="1.0" encoding="utf-8"?>
+<p:sld xmlns:a="http://schemas.openxmlformats.org/drawingml/2006/main" xmlns:r="http://schemas.openxmlformats.org/officeDocument/2006/relationships" xmlns:p="http://schemas.openxmlformats.org/presentationml/2006/main">
+  <p:cSld>
+    <p:spTree>
+      <p:nvGrpSpPr>
+        <p:cNvPr id="1" name=""/>
+        <p:cNvGrpSpPr/>
+        <p:nvPr/>
+      </p:nvGrpSpPr>
+      <p:grpSpPr>
+        <a:xfrm>
+          <a:off x="0" y="0"/>
+          <a:ext cx="0" cy="0"/>
+          <a:chOff x="0" y="0"/>
+          <a:chExt cx="0" cy="0"/>
+        </a:xfrm>
+      </p:grpSpPr>
+      <p:pic>
+        <p:nvPicPr>
+          <p:cNvPr id="3" name="図 2"/>
+          <p:cNvPicPr>
+            <a:picLocks noChangeAspect="1"/>
+          </p:cNvPicPr>
+          <p:nvPr/>
+        </p:nvPicPr>
+        <p:blipFill>
+          <a:blip r:embed="rId2"/>
+          <a:stretch>
+            <a:fillRect/>
+          </a:stretch>
+        </p:blipFill>
+        <p:spPr>
+          <a:xfrm>
+            <a:off x="267238" y="1205189"/>
+            <a:ext cx="8609524" cy="4447619"/>
+          </a:xfrm>
+          <a:prstGeom prst="rect">
+            <a:avLst/>
+          </a:prstGeom>
+        </p:spPr>
+      </p:pic>
+    </p:spTree>
+    <p:extLst>
+      <p:ext uri="{BB962C8B-B14F-4D97-AF65-F5344CB8AC3E}">
+        <p14:creationId xmlns:p14="http://schemas.microsoft.com/office/powerpoint/2010/main" val="1406384281"/>
+      </p:ext>
+    </p:extLst>
+  </p:cSld>
+  <p:clrMapOvr>
+    <a:masterClrMapping/>
+  </p:clrMapOvr>
+</p:sld>
+</file>
+
+<file path=ppt/slides/slide6.xml><?xml version="1.0" encoding="utf-8"?>
+<p:sld xmlns:a="http://schemas.openxmlformats.org/drawingml/2006/main" xmlns:r="http://schemas.openxmlformats.org/officeDocument/2006/relationships" xmlns:p="http://schemas.openxmlformats.org/presentationml/2006/main">
+  <p:cSld>
+    <p:spTree>
+      <p:nvGrpSpPr>
+        <p:cNvPr id="1" name=""/>
+        <p:cNvGrpSpPr/>
+        <p:nvPr/>
+      </p:nvGrpSpPr>
+      <p:grpSpPr>
+        <a:xfrm>
+          <a:off x="0" y="0"/>
+          <a:ext cx="0" cy="0"/>
+          <a:chOff x="0" y="0"/>
+          <a:chExt cx="0" cy="0"/>
+        </a:xfrm>
+      </p:grpSpPr>
+      <p:pic>
+        <p:nvPicPr>
+          <p:cNvPr id="2" name="図 1"/>
+          <p:cNvPicPr>
+            <a:picLocks noChangeAspect="1"/>
+          </p:cNvPicPr>
+          <p:nvPr/>
+        </p:nvPicPr>
+        <p:blipFill>
+          <a:blip r:embed="rId2"/>
+          <a:stretch>
+            <a:fillRect/>
+          </a:stretch>
+        </p:blipFill>
+        <p:spPr>
+          <a:xfrm>
+            <a:off x="1690687" y="1300162"/>
+            <a:ext cx="5762625" cy="4257675"/>
+          </a:xfrm>
+          <a:prstGeom prst="rect">
+            <a:avLst/>
+          </a:prstGeom>
+        </p:spPr>
+      </p:pic>
+    </p:spTree>
+    <p:extLst>
+      <p:ext uri="{BB962C8B-B14F-4D97-AF65-F5344CB8AC3E}">
+        <p14:creationId xmlns:p14="http://schemas.microsoft.com/office/powerpoint/2010/main" val="1973263840"/>
+      </p:ext>
+    </p:extLst>
+  </p:cSld>
+  <p:clrMapOvr>
+    <a:masterClrMapping/>
+  </p:clrMapOvr>
+</p:sld>
+</file>
+
+<file path=ppt/slides/slide7.xml><?xml version="1.0" encoding="utf-8"?>
+<p:sld xmlns:a="http://schemas.openxmlformats.org/drawingml/2006/main" xmlns:r="http://schemas.openxmlformats.org/officeDocument/2006/relationships" xmlns:p="http://schemas.openxmlformats.org/presentationml/2006/main">
+  <p:cSld>
+    <p:spTree>
+      <p:nvGrpSpPr>
+        <p:cNvPr id="1" name=""/>
+        <p:cNvGrpSpPr/>
+        <p:nvPr/>
+      </p:nvGrpSpPr>
+      <p:grpSpPr>
+        <a:xfrm>
+          <a:off x="0" y="0"/>
+          <a:ext cx="0" cy="0"/>
+          <a:chOff x="0" y="0"/>
+          <a:chExt cx="0" cy="0"/>
+        </a:xfrm>
+      </p:grpSpPr>
+      <p:pic>
+        <p:nvPicPr>
+          <p:cNvPr id="2" name="図 1"/>
+          <p:cNvPicPr>
+            <a:picLocks noChangeAspect="1"/>
+          </p:cNvPicPr>
+          <p:nvPr/>
+        </p:nvPicPr>
+        <p:blipFill>
+          <a:blip r:embed="rId2"/>
+          <a:stretch>
+            <a:fillRect/>
+          </a:stretch>
+        </p:blipFill>
+        <p:spPr>
+          <a:xfrm>
+            <a:off x="1690687" y="1300162"/>
+            <a:ext cx="5762625" cy="4257675"/>
+          </a:xfrm>
+          <a:prstGeom prst="rect">
+            <a:avLst/>
+          </a:prstGeom>
+        </p:spPr>
+      </p:pic>
+    </p:spTree>
+    <p:extLst>
+      <p:ext uri="{BB962C8B-B14F-4D97-AF65-F5344CB8AC3E}">
+        <p14:creationId xmlns:p14="http://schemas.microsoft.com/office/powerpoint/2010/main" val="2124809501"/>
+      </p:ext>
+    </p:extLst>
+  </p:cSld>
+  <p:clrMapOvr>
+    <a:masterClrMapping/>
+  </p:clrMapOvr>
+</p:sld>
+</file>
+
+<file path=ppt/slides/slide8.xml><?xml version="1.0" encoding="utf-8"?>
+<p:sld xmlns:a="http://schemas.openxmlformats.org/drawingml/2006/main" xmlns:r="http://schemas.openxmlformats.org/officeDocument/2006/relationships" xmlns:p="http://schemas.openxmlformats.org/presentationml/2006/main">
+  <p:cSld>
+    <p:spTree>
+      <p:nvGrpSpPr>
+        <p:cNvPr id="1" name=""/>
+        <p:cNvGrpSpPr/>
+        <p:nvPr/>
+      </p:nvGrpSpPr>
+      <p:grpSpPr>
+        <a:xfrm>
+          <a:off x="0" y="0"/>
+          <a:ext cx="0" cy="0"/>
+          <a:chOff x="0" y="0"/>
+          <a:chExt cx="0" cy="0"/>
+        </a:xfrm>
+      </p:grpSpPr>
+      <p:pic>
+        <p:nvPicPr>
+          <p:cNvPr id="2" name="図 1"/>
+          <p:cNvPicPr>
+            <a:picLocks noChangeAspect="1"/>
+          </p:cNvPicPr>
+          <p:nvPr/>
+        </p:nvPicPr>
+        <p:blipFill>
+          <a:blip r:embed="rId2"/>
+          <a:stretch>
+            <a:fillRect/>
+          </a:stretch>
+        </p:blipFill>
+        <p:spPr>
+          <a:xfrm>
+            <a:off x="1690687" y="1300162"/>
+            <a:ext cx="5762625" cy="4257675"/>
+          </a:xfrm>
+          <a:prstGeom prst="rect">
+            <a:avLst/>
+          </a:prstGeom>
+        </p:spPr>
+      </p:pic>
+    </p:spTree>
+    <p:extLst>
+      <p:ext uri="{BB962C8B-B14F-4D97-AF65-F5344CB8AC3E}">
+        <p14:creationId xmlns:p14="http://schemas.microsoft.com/office/powerpoint/2010/main" val="3505931460"/>
+      </p:ext>
+    </p:extLst>
+  </p:cSld>
+  <p:clrMapOvr>
+    <a:masterClrMapping/>
+  </p:clrMapOvr>
+</p:sld>
+</file>
+
+<file path=ppt/slides/slide9.xml><?xml version="1.0" encoding="utf-8"?>
+<p:sld xmlns:a="http://schemas.openxmlformats.org/drawingml/2006/main" xmlns:r="http://schemas.openxmlformats.org/officeDocument/2006/relationships" xmlns:p="http://schemas.openxmlformats.org/presentationml/2006/main">
+  <p:cSld>
+    <p:spTree>
+      <p:nvGrpSpPr>
+        <p:cNvPr id="1" name=""/>
+        <p:cNvGrpSpPr/>
+        <p:nvPr/>
+      </p:nvGrpSpPr>
+      <p:grpSpPr>
+        <a:xfrm>
+          <a:off x="0" y="0"/>
+          <a:ext cx="0" cy="0"/>
+          <a:chOff x="0" y="0"/>
+          <a:chExt cx="0" cy="0"/>
+        </a:xfrm>
+      </p:grpSpPr>
+      <p:pic>
+        <p:nvPicPr>
+          <p:cNvPr id="2" name="図 1"/>
+          <p:cNvPicPr>
+            <a:picLocks noChangeAspect="1"/>
+          </p:cNvPicPr>
+          <p:nvPr/>
+        </p:nvPicPr>
+        <p:blipFill>
+          <a:blip r:embed="rId2"/>
+          <a:stretch>
+            <a:fillRect/>
+          </a:stretch>
+        </p:blipFill>
+        <p:spPr>
+          <a:xfrm>
+            <a:off x="1395412" y="1971675"/>
+            <a:ext cx="6353175" cy="2914650"/>
+          </a:xfrm>
+          <a:prstGeom prst="rect">
+            <a:avLst/>
+          </a:prstGeom>
+        </p:spPr>
+      </p:pic>
+    </p:spTree>
+    <p:extLst>
+      <p:ext uri="{BB962C8B-B14F-4D97-AF65-F5344CB8AC3E}">
+        <p14:creationId xmlns:p14="http://schemas.microsoft.com/office/powerpoint/2010/main" val="3100481691"/>
       </p:ext>
     </p:extLst>
   </p:cSld>

</xml_diff>

<commit_message>
write chapter 12:modify trunk
</commit_message>
<xml_diff>
--- a/pptx/chapter-12.pptx
+++ b/pptx/chapter-12.pptx
@@ -8,6 +8,7 @@
     <p:sldId id="273" r:id="rId2"/>
     <p:sldId id="274" r:id="rId3"/>
     <p:sldId id="275" r:id="rId4"/>
+    <p:sldId id="276" r:id="rId5"/>
   </p:sldIdLst>
   <p:sldSz cx="9144000" cy="6858000" type="screen4x3"/>
   <p:notesSz cx="6858000" cy="9144000"/>
@@ -3406,6 +3407,60 @@
 </p:sld>
 </file>
 
+<file path=ppt/slides/slide4.xml><?xml version="1.0" encoding="utf-8"?>
+<p:sld xmlns:a="http://schemas.openxmlformats.org/drawingml/2006/main" xmlns:r="http://schemas.openxmlformats.org/officeDocument/2006/relationships" xmlns:p="http://schemas.openxmlformats.org/presentationml/2006/main">
+  <p:cSld>
+    <p:spTree>
+      <p:nvGrpSpPr>
+        <p:cNvPr id="1" name=""/>
+        <p:cNvGrpSpPr/>
+        <p:nvPr/>
+      </p:nvGrpSpPr>
+      <p:grpSpPr>
+        <a:xfrm>
+          <a:off x="0" y="0"/>
+          <a:ext cx="0" cy="0"/>
+          <a:chOff x="0" y="0"/>
+          <a:chExt cx="0" cy="0"/>
+        </a:xfrm>
+      </p:grpSpPr>
+      <p:pic>
+        <p:nvPicPr>
+          <p:cNvPr id="2" name="図 1"/>
+          <p:cNvPicPr>
+            <a:picLocks noChangeAspect="1"/>
+          </p:cNvPicPr>
+          <p:nvPr/>
+        </p:nvPicPr>
+        <p:blipFill>
+          <a:blip r:embed="rId2"/>
+          <a:stretch>
+            <a:fillRect/>
+          </a:stretch>
+        </p:blipFill>
+        <p:spPr>
+          <a:xfrm>
+            <a:off x="1628775" y="942975"/>
+            <a:ext cx="5886450" cy="4972050"/>
+          </a:xfrm>
+          <a:prstGeom prst="rect">
+            <a:avLst/>
+          </a:prstGeom>
+        </p:spPr>
+      </p:pic>
+    </p:spTree>
+    <p:extLst>
+      <p:ext uri="{BB962C8B-B14F-4D97-AF65-F5344CB8AC3E}">
+        <p14:creationId xmlns:p14="http://schemas.microsoft.com/office/powerpoint/2010/main" val="3511219993"/>
+      </p:ext>
+    </p:extLst>
+  </p:cSld>
+  <p:clrMapOvr>
+    <a:masterClrMapping/>
+  </p:clrMapOvr>
+</p:sld>
+</file>
+
 <file path=ppt/theme/theme1.xml><?xml version="1.0" encoding="utf-8"?>
 <a:theme xmlns:a="http://schemas.openxmlformats.org/drawingml/2006/main" name="Office テーマ">
   <a:themeElements>

</xml_diff>